<commit_message>
AVR push 2: practice day
</commit_message>
<xml_diff>
--- a/2018 Smart Dashboard/SmartDashboardBackground.pptx
+++ b/2018 Smart Dashboard/SmartDashboardBackground.pptx
@@ -243,7 +243,7 @@
           <a:p>
             <a:fld id="{4356D3EA-6E82-4F05-B9F9-610E57DBF7FE}" type="datetimeFigureOut">
               <a:rPr lang="en-US" smtClean="0"/>
-              <a:t>3/10/2018</a:t>
+              <a:t>4/5/2018</a:t>
             </a:fld>
             <a:endParaRPr lang="en-US"/>
           </a:p>
@@ -413,7 +413,7 @@
           <a:p>
             <a:fld id="{4356D3EA-6E82-4F05-B9F9-610E57DBF7FE}" type="datetimeFigureOut">
               <a:rPr lang="en-US" smtClean="0"/>
-              <a:t>3/10/2018</a:t>
+              <a:t>4/5/2018</a:t>
             </a:fld>
             <a:endParaRPr lang="en-US"/>
           </a:p>
@@ -593,7 +593,7 @@
           <a:p>
             <a:fld id="{4356D3EA-6E82-4F05-B9F9-610E57DBF7FE}" type="datetimeFigureOut">
               <a:rPr lang="en-US" smtClean="0"/>
-              <a:t>3/10/2018</a:t>
+              <a:t>4/5/2018</a:t>
             </a:fld>
             <a:endParaRPr lang="en-US"/>
           </a:p>
@@ -763,7 +763,7 @@
           <a:p>
             <a:fld id="{4356D3EA-6E82-4F05-B9F9-610E57DBF7FE}" type="datetimeFigureOut">
               <a:rPr lang="en-US" smtClean="0"/>
-              <a:t>3/10/2018</a:t>
+              <a:t>4/5/2018</a:t>
             </a:fld>
             <a:endParaRPr lang="en-US"/>
           </a:p>
@@ -1009,7 +1009,7 @@
           <a:p>
             <a:fld id="{4356D3EA-6E82-4F05-B9F9-610E57DBF7FE}" type="datetimeFigureOut">
               <a:rPr lang="en-US" smtClean="0"/>
-              <a:t>3/10/2018</a:t>
+              <a:t>4/5/2018</a:t>
             </a:fld>
             <a:endParaRPr lang="en-US"/>
           </a:p>
@@ -1241,7 +1241,7 @@
           <a:p>
             <a:fld id="{4356D3EA-6E82-4F05-B9F9-610E57DBF7FE}" type="datetimeFigureOut">
               <a:rPr lang="en-US" smtClean="0"/>
-              <a:t>3/10/2018</a:t>
+              <a:t>4/5/2018</a:t>
             </a:fld>
             <a:endParaRPr lang="en-US"/>
           </a:p>
@@ -1608,7 +1608,7 @@
           <a:p>
             <a:fld id="{4356D3EA-6E82-4F05-B9F9-610E57DBF7FE}" type="datetimeFigureOut">
               <a:rPr lang="en-US" smtClean="0"/>
-              <a:t>3/10/2018</a:t>
+              <a:t>4/5/2018</a:t>
             </a:fld>
             <a:endParaRPr lang="en-US"/>
           </a:p>
@@ -1726,7 +1726,7 @@
           <a:p>
             <a:fld id="{4356D3EA-6E82-4F05-B9F9-610E57DBF7FE}" type="datetimeFigureOut">
               <a:rPr lang="en-US" smtClean="0"/>
-              <a:t>3/10/2018</a:t>
+              <a:t>4/5/2018</a:t>
             </a:fld>
             <a:endParaRPr lang="en-US"/>
           </a:p>
@@ -1821,7 +1821,7 @@
           <a:p>
             <a:fld id="{4356D3EA-6E82-4F05-B9F9-610E57DBF7FE}" type="datetimeFigureOut">
               <a:rPr lang="en-US" smtClean="0"/>
-              <a:t>3/10/2018</a:t>
+              <a:t>4/5/2018</a:t>
             </a:fld>
             <a:endParaRPr lang="en-US"/>
           </a:p>
@@ -2098,7 +2098,7 @@
           <a:p>
             <a:fld id="{4356D3EA-6E82-4F05-B9F9-610E57DBF7FE}" type="datetimeFigureOut">
               <a:rPr lang="en-US" smtClean="0"/>
-              <a:t>3/10/2018</a:t>
+              <a:t>4/5/2018</a:t>
             </a:fld>
             <a:endParaRPr lang="en-US"/>
           </a:p>
@@ -2351,7 +2351,7 @@
           <a:p>
             <a:fld id="{4356D3EA-6E82-4F05-B9F9-610E57DBF7FE}" type="datetimeFigureOut">
               <a:rPr lang="en-US" smtClean="0"/>
-              <a:t>3/10/2018</a:t>
+              <a:t>4/5/2018</a:t>
             </a:fld>
             <a:endParaRPr lang="en-US"/>
           </a:p>
@@ -2564,7 +2564,7 @@
           <a:p>
             <a:fld id="{4356D3EA-6E82-4F05-B9F9-610E57DBF7FE}" type="datetimeFigureOut">
               <a:rPr lang="en-US" smtClean="0"/>
-              <a:t>3/10/2018</a:t>
+              <a:t>4/5/2018</a:t>
             </a:fld>
             <a:endParaRPr lang="en-US"/>
           </a:p>
@@ -2971,7 +2971,7 @@
       </p:grpSpPr>
       <p:grpSp>
         <p:nvGrpSpPr>
-          <p:cNvPr id="59" name="Group 58"/>
+          <p:cNvPr id="38" name="Group 37"/>
           <p:cNvGrpSpPr/>
           <p:nvPr/>
         </p:nvGrpSpPr>
@@ -3051,8 +3051,8 @@
           </p:nvSpPr>
           <p:spPr>
             <a:xfrm>
-              <a:off x="7528560" y="5245099"/>
-              <a:ext cx="3351927" cy="610723"/>
+              <a:off x="7801448" y="5245099"/>
+              <a:ext cx="3079039" cy="610723"/>
             </a:xfrm>
             <a:prstGeom prst="rect">
               <a:avLst/>
@@ -3110,7 +3110,7 @@
           </p:nvSpPr>
           <p:spPr>
             <a:xfrm>
-              <a:off x="8374867" y="5119418"/>
+              <a:off x="8470895" y="5119418"/>
               <a:ext cx="1745992" cy="261610"/>
             </a:xfrm>
             <a:prstGeom prst="rect">
@@ -3135,14 +3135,7 @@
                   <a:latin typeface="Arial" panose="020B0604020202020204" pitchFamily="34" charset="0"/>
                   <a:cs typeface="Arial" panose="020B0604020202020204" pitchFamily="34" charset="0"/>
                 </a:rPr>
-                <a:t>Proudly </a:t>
-              </a:r>
-              <a:r>
-                <a:rPr lang="en-US" sz="1100" b="1" dirty="0" smtClean="0">
-                  <a:latin typeface="Arial" panose="020B0604020202020204" pitchFamily="34" charset="0"/>
-                  <a:cs typeface="Arial" panose="020B0604020202020204" pitchFamily="34" charset="0"/>
-                </a:rPr>
-                <a:t>Sponsored By</a:t>
+                <a:t>Proudly Sponsored By</a:t>
               </a:r>
               <a:endParaRPr lang="en-US" sz="1100" b="1" dirty="0">
                 <a:latin typeface="Arial" panose="020B0604020202020204" pitchFamily="34" charset="0"/>
@@ -3159,8 +3152,8 @@
           </p:nvSpPr>
           <p:spPr>
             <a:xfrm>
-              <a:off x="1217676" y="4558284"/>
-              <a:ext cx="6217920" cy="1371600"/>
+              <a:off x="1318266" y="4558284"/>
+              <a:ext cx="6117330" cy="1297538"/>
             </a:xfrm>
             <a:prstGeom prst="rect">
               <a:avLst/>
@@ -3202,7 +3195,17 @@
                   <a:latin typeface="Arial" panose="020B0604020202020204" pitchFamily="34" charset="0"/>
                   <a:cs typeface="Arial" panose="020B0604020202020204" pitchFamily="34" charset="0"/>
                 </a:rPr>
-                <a:t>Where’s the driver station??</a:t>
+                <a:t>Where’s the driver </a:t>
+              </a:r>
+              <a:r>
+                <a:rPr lang="en-US" sz="1400" dirty="0" smtClean="0">
+                  <a:solidFill>
+                    <a:schemeClr val="tx1"/>
+                  </a:solidFill>
+                  <a:latin typeface="Arial" panose="020B0604020202020204" pitchFamily="34" charset="0"/>
+                  <a:cs typeface="Arial" panose="020B0604020202020204" pitchFamily="34" charset="0"/>
+                </a:rPr>
+                <a:t>station?</a:t>
               </a:r>
               <a:endParaRPr lang="en-US" sz="1400" dirty="0">
                 <a:solidFill>
@@ -3222,10 +3225,10 @@
           </p:nvGrpSpPr>
           <p:grpSpPr>
             <a:xfrm>
-              <a:off x="1349614" y="2039519"/>
-              <a:ext cx="1828800" cy="2377965"/>
-              <a:chOff x="1396180" y="1487307"/>
-              <a:chExt cx="2255311" cy="2932551"/>
+              <a:off x="1318266" y="991659"/>
+              <a:ext cx="3917823" cy="3428233"/>
+              <a:chOff x="1396180" y="1538686"/>
+              <a:chExt cx="2255311" cy="2881172"/>
             </a:xfrm>
           </p:grpSpPr>
           <p:sp>
@@ -3290,8 +3293,8 @@
             </p:nvSpPr>
             <p:spPr>
               <a:xfrm>
-                <a:off x="1936512" y="1487307"/>
-                <a:ext cx="1174647" cy="322622"/>
+                <a:off x="2249678" y="1538686"/>
+                <a:ext cx="548313" cy="219864"/>
               </a:xfrm>
               <a:prstGeom prst="rect">
                 <a:avLst/>
@@ -3315,228 +3318,16 @@
                     <a:latin typeface="Arial" panose="020B0604020202020204" pitchFamily="34" charset="0"/>
                     <a:cs typeface="Arial" panose="020B0604020202020204" pitchFamily="34" charset="0"/>
                   </a:rPr>
-                  <a:t>Robot View</a:t>
+                  <a:t>Robot </a:t>
                 </a:r>
-                <a:endParaRPr lang="en-US" sz="1100" b="1" dirty="0">
-                  <a:latin typeface="Arial" panose="020B0604020202020204" pitchFamily="34" charset="0"/>
-                  <a:cs typeface="Arial" panose="020B0604020202020204" pitchFamily="34" charset="0"/>
-                </a:endParaRPr>
-              </a:p>
-            </p:txBody>
-          </p:sp>
-        </p:grpSp>
-        <p:grpSp>
-          <p:nvGrpSpPr>
-            <p:cNvPr id="24" name="Group 23"/>
-            <p:cNvGrpSpPr/>
-            <p:nvPr/>
-          </p:nvGrpSpPr>
-          <p:grpSpPr>
-            <a:xfrm>
-              <a:off x="1349614" y="999078"/>
-              <a:ext cx="1828800" cy="884734"/>
-              <a:chOff x="1349614" y="999078"/>
-              <a:chExt cx="1828800" cy="884734"/>
-            </a:xfrm>
-          </p:grpSpPr>
-          <p:sp>
-            <p:nvSpPr>
-              <p:cNvPr id="12" name="Rectangle 11"/>
-              <p:cNvSpPr/>
-              <p:nvPr/>
-            </p:nvSpPr>
-            <p:spPr>
-              <a:xfrm>
-                <a:off x="1349614" y="1129884"/>
-                <a:ext cx="1828800" cy="753928"/>
-              </a:xfrm>
-              <a:prstGeom prst="rect">
-                <a:avLst/>
-              </a:prstGeom>
-              <a:noFill/>
-              <a:ln w="28575">
-                <a:solidFill>
-                  <a:schemeClr val="accent5">
-                    <a:lumMod val="50000"/>
-                  </a:schemeClr>
-                </a:solidFill>
-              </a:ln>
-            </p:spPr>
-            <p:style>
-              <a:lnRef idx="2">
-                <a:schemeClr val="accent1">
-                  <a:shade val="50000"/>
-                </a:schemeClr>
-              </a:lnRef>
-              <a:fillRef idx="1">
-                <a:schemeClr val="accent1"/>
-              </a:fillRef>
-              <a:effectRef idx="0">
-                <a:schemeClr val="accent1"/>
-              </a:effectRef>
-              <a:fontRef idx="minor">
-                <a:schemeClr val="lt1"/>
-              </a:fontRef>
-            </p:style>
-            <p:txBody>
-              <a:bodyPr rtlCol="0" anchor="ctr"/>
-              <a:lstStyle/>
-              <a:p>
-                <a:pPr algn="ctr"/>
-                <a:endParaRPr lang="en-US">
-                  <a:solidFill>
-                    <a:schemeClr val="tx1"/>
-                  </a:solidFill>
-                  <a:latin typeface="Arial" panose="020B0604020202020204" pitchFamily="34" charset="0"/>
-                  <a:cs typeface="Arial" panose="020B0604020202020204" pitchFamily="34" charset="0"/>
-                </a:endParaRPr>
-              </a:p>
-            </p:txBody>
-          </p:sp>
-          <p:sp>
-            <p:nvSpPr>
-              <p:cNvPr id="13" name="TextBox 12"/>
-              <p:cNvSpPr txBox="1"/>
-              <p:nvPr/>
-            </p:nvSpPr>
-            <p:spPr>
-              <a:xfrm>
-                <a:off x="1754874" y="999078"/>
-                <a:ext cx="1015021" cy="261610"/>
-              </a:xfrm>
-              <a:prstGeom prst="rect">
-                <a:avLst/>
-              </a:prstGeom>
-              <a:solidFill>
-                <a:schemeClr val="accent1">
-                  <a:lumMod val="20000"/>
-                  <a:lumOff val="80000"/>
-                </a:schemeClr>
-              </a:solidFill>
-            </p:spPr>
-            <p:txBody>
-              <a:bodyPr wrap="none" rtlCol="0" anchor="ctr">
-                <a:spAutoFit/>
-              </a:bodyPr>
-              <a:lstStyle/>
-              <a:p>
-                <a:pPr algn="ctr"/>
                 <a:r>
                   <a:rPr lang="en-US" sz="1100" b="1" dirty="0" smtClean="0">
                     <a:latin typeface="Arial" panose="020B0604020202020204" pitchFamily="34" charset="0"/>
                     <a:cs typeface="Arial" panose="020B0604020202020204" pitchFamily="34" charset="0"/>
                   </a:rPr>
-                  <a:t>Field Layout</a:t>
+                  <a:t>View</a:t>
                 </a:r>
                 <a:endParaRPr lang="en-US" sz="1100" b="1" dirty="0">
-                  <a:latin typeface="Arial" panose="020B0604020202020204" pitchFamily="34" charset="0"/>
-                  <a:cs typeface="Arial" panose="020B0604020202020204" pitchFamily="34" charset="0"/>
-                </a:endParaRPr>
-              </a:p>
-            </p:txBody>
-          </p:sp>
-          <p:sp>
-            <p:nvSpPr>
-              <p:cNvPr id="14" name="TextBox 13"/>
-              <p:cNvSpPr txBox="1"/>
-              <p:nvPr/>
-            </p:nvSpPr>
-            <p:spPr>
-              <a:xfrm>
-                <a:off x="2162313" y="1229601"/>
-                <a:ext cx="670376" cy="215444"/>
-              </a:xfrm>
-              <a:prstGeom prst="rect">
-                <a:avLst/>
-              </a:prstGeom>
-              <a:noFill/>
-            </p:spPr>
-            <p:txBody>
-              <a:bodyPr wrap="none" rtlCol="0" anchor="ctr">
-                <a:spAutoFit/>
-              </a:bodyPr>
-              <a:lstStyle/>
-              <a:p>
-                <a:r>
-                  <a:rPr lang="en-US" sz="800" dirty="0" smtClean="0">
-                    <a:latin typeface="Arial" panose="020B0604020202020204" pitchFamily="34" charset="0"/>
-                    <a:cs typeface="Arial" panose="020B0604020202020204" pitchFamily="34" charset="0"/>
-                  </a:rPr>
-                  <a:t>Far Switch</a:t>
-                </a:r>
-                <a:endParaRPr lang="en-US" sz="800" dirty="0">
-                  <a:latin typeface="Arial" panose="020B0604020202020204" pitchFamily="34" charset="0"/>
-                  <a:cs typeface="Arial" panose="020B0604020202020204" pitchFamily="34" charset="0"/>
-                </a:endParaRPr>
-              </a:p>
-            </p:txBody>
-          </p:sp>
-          <p:sp>
-            <p:nvSpPr>
-              <p:cNvPr id="15" name="TextBox 14"/>
-              <p:cNvSpPr txBox="1"/>
-              <p:nvPr/>
-            </p:nvSpPr>
-            <p:spPr>
-              <a:xfrm>
-                <a:off x="2162313" y="1443546"/>
-                <a:ext cx="442750" cy="215444"/>
-              </a:xfrm>
-              <a:prstGeom prst="rect">
-                <a:avLst/>
-              </a:prstGeom>
-              <a:noFill/>
-            </p:spPr>
-            <p:txBody>
-              <a:bodyPr wrap="none" rtlCol="0" anchor="ctr">
-                <a:spAutoFit/>
-              </a:bodyPr>
-              <a:lstStyle/>
-              <a:p>
-                <a:r>
-                  <a:rPr lang="en-US" sz="800" dirty="0" smtClean="0">
-                    <a:latin typeface="Arial" panose="020B0604020202020204" pitchFamily="34" charset="0"/>
-                    <a:cs typeface="Arial" panose="020B0604020202020204" pitchFamily="34" charset="0"/>
-                  </a:rPr>
-                  <a:t>Scale</a:t>
-                </a:r>
-                <a:endParaRPr lang="en-US" sz="800" dirty="0">
-                  <a:latin typeface="Arial" panose="020B0604020202020204" pitchFamily="34" charset="0"/>
-                  <a:cs typeface="Arial" panose="020B0604020202020204" pitchFamily="34" charset="0"/>
-                </a:endParaRPr>
-              </a:p>
-            </p:txBody>
-          </p:sp>
-          <p:sp>
-            <p:nvSpPr>
-              <p:cNvPr id="16" name="TextBox 15"/>
-              <p:cNvSpPr txBox="1"/>
-              <p:nvPr/>
-            </p:nvSpPr>
-            <p:spPr>
-              <a:xfrm>
-                <a:off x="2162313" y="1652979"/>
-                <a:ext cx="739305" cy="215444"/>
-              </a:xfrm>
-              <a:prstGeom prst="rect">
-                <a:avLst/>
-              </a:prstGeom>
-              <a:noFill/>
-            </p:spPr>
-            <p:txBody>
-              <a:bodyPr wrap="none" rtlCol="0" anchor="ctr">
-                <a:spAutoFit/>
-              </a:bodyPr>
-              <a:lstStyle/>
-              <a:p>
-                <a:r>
-                  <a:rPr lang="en-US" sz="800" dirty="0" smtClean="0">
-                    <a:latin typeface="Arial" panose="020B0604020202020204" pitchFamily="34" charset="0"/>
-                    <a:cs typeface="Arial" panose="020B0604020202020204" pitchFamily="34" charset="0"/>
-                  </a:rPr>
-                  <a:t>Near Switch</a:t>
-                </a:r>
-                <a:endParaRPr lang="en-US" sz="800" dirty="0">
                   <a:latin typeface="Arial" panose="020B0604020202020204" pitchFamily="34" charset="0"/>
                   <a:cs typeface="Arial" panose="020B0604020202020204" pitchFamily="34" charset="0"/>
                 </a:endParaRPr>
@@ -3552,10 +3343,10 @@
           </p:nvGrpSpPr>
           <p:grpSpPr>
             <a:xfrm>
-              <a:off x="9021641" y="999078"/>
-              <a:ext cx="1828800" cy="884734"/>
-              <a:chOff x="9013587" y="999078"/>
-              <a:chExt cx="1828800" cy="884734"/>
+              <a:off x="9401543" y="991176"/>
+              <a:ext cx="1463040" cy="999484"/>
+              <a:chOff x="9013587" y="1020325"/>
+              <a:chExt cx="1828800" cy="837138"/>
             </a:xfrm>
           </p:grpSpPr>
           <p:sp>
@@ -3566,8 +3357,8 @@
             </p:nvSpPr>
             <p:spPr>
               <a:xfrm>
-                <a:off x="9013587" y="1129884"/>
-                <a:ext cx="1828800" cy="753928"/>
+                <a:off x="9013587" y="1129882"/>
+                <a:ext cx="1828800" cy="727581"/>
               </a:xfrm>
               <a:prstGeom prst="rect">
                 <a:avLst/>
@@ -3620,8 +3411,8 @@
             </p:nvSpPr>
             <p:spPr>
               <a:xfrm>
-                <a:off x="9557532" y="999078"/>
-                <a:ext cx="740908" cy="261610"/>
+                <a:off x="9464918" y="1020325"/>
+                <a:ext cx="926135" cy="219117"/>
               </a:xfrm>
               <a:prstGeom prst="rect">
                 <a:avLst/>
@@ -3663,10 +3454,10 @@
           </p:nvGrpSpPr>
           <p:grpSpPr>
             <a:xfrm>
-              <a:off x="9021643" y="2039355"/>
-              <a:ext cx="1828800" cy="884734"/>
-              <a:chOff x="9013587" y="999078"/>
-              <a:chExt cx="1828800" cy="884734"/>
+              <a:off x="9401545" y="2020085"/>
+              <a:ext cx="1463040" cy="999486"/>
+              <a:chOff x="9013587" y="1020325"/>
+              <a:chExt cx="1828800" cy="837140"/>
             </a:xfrm>
           </p:grpSpPr>
           <p:sp>
@@ -3678,7 +3469,7 @@
             <p:spPr>
               <a:xfrm>
                 <a:off x="9013587" y="1129884"/>
-                <a:ext cx="1828800" cy="753928"/>
+                <a:ext cx="1828800" cy="727581"/>
               </a:xfrm>
               <a:prstGeom prst="rect">
                 <a:avLst/>
@@ -3731,8 +3522,8 @@
             </p:nvSpPr>
             <p:spPr>
               <a:xfrm>
-                <a:off x="9503030" y="999078"/>
-                <a:ext cx="849912" cy="261610"/>
+                <a:off x="9396791" y="1020325"/>
+                <a:ext cx="1062391" cy="219117"/>
               </a:xfrm>
               <a:prstGeom prst="rect">
                 <a:avLst/>
@@ -3756,7 +3547,14 @@
                     <a:latin typeface="Arial" panose="020B0604020202020204" pitchFamily="34" charset="0"/>
                     <a:cs typeface="Arial" panose="020B0604020202020204" pitchFamily="34" charset="0"/>
                   </a:rPr>
-                  <a:t>Arm Pivot</a:t>
+                  <a:t>Arm </a:t>
+                </a:r>
+                <a:r>
+                  <a:rPr lang="en-US" sz="1100" b="1" dirty="0" smtClean="0">
+                    <a:latin typeface="Arial" panose="020B0604020202020204" pitchFamily="34" charset="0"/>
+                    <a:cs typeface="Arial" panose="020B0604020202020204" pitchFamily="34" charset="0"/>
+                  </a:rPr>
+                  <a:t>Pivot</a:t>
                 </a:r>
                 <a:endParaRPr lang="en-US" sz="1100" b="1" dirty="0">
                   <a:latin typeface="Arial" panose="020B0604020202020204" pitchFamily="34" charset="0"/>
@@ -3774,10 +3572,10 @@
           </p:nvGrpSpPr>
           <p:grpSpPr>
             <a:xfrm>
-              <a:off x="9021643" y="3079632"/>
-              <a:ext cx="1828800" cy="884734"/>
-              <a:chOff x="9013587" y="999078"/>
-              <a:chExt cx="1828800" cy="884734"/>
+              <a:off x="9401545" y="3048996"/>
+              <a:ext cx="1463040" cy="999485"/>
+              <a:chOff x="9013587" y="1018636"/>
+              <a:chExt cx="1828800" cy="850040"/>
             </a:xfrm>
           </p:grpSpPr>
           <p:sp>
@@ -3788,8 +3586,8 @@
             </p:nvSpPr>
             <p:spPr>
               <a:xfrm>
-                <a:off x="9013587" y="1129884"/>
-                <a:ext cx="1828800" cy="753928"/>
+                <a:off x="9013587" y="1129883"/>
+                <a:ext cx="1828800" cy="738793"/>
               </a:xfrm>
               <a:prstGeom prst="rect">
                 <a:avLst/>
@@ -3842,8 +3640,8 @@
             </p:nvSpPr>
             <p:spPr>
               <a:xfrm>
-                <a:off x="9436505" y="999078"/>
-                <a:ext cx="982961" cy="261610"/>
+                <a:off x="9313635" y="1018636"/>
+                <a:ext cx="1228701" cy="222494"/>
               </a:xfrm>
               <a:prstGeom prst="rect">
                 <a:avLst/>
@@ -3885,10 +3683,10 @@
           </p:nvGrpSpPr>
           <p:grpSpPr>
             <a:xfrm>
-              <a:off x="9021643" y="4119910"/>
-              <a:ext cx="1828800" cy="884734"/>
-              <a:chOff x="9013587" y="999078"/>
-              <a:chExt cx="1828800" cy="884734"/>
+              <a:off x="9401545" y="4077907"/>
+              <a:ext cx="1463040" cy="999485"/>
+              <a:chOff x="9013587" y="1014098"/>
+              <a:chExt cx="1828800" cy="884714"/>
             </a:xfrm>
           </p:grpSpPr>
           <p:sp>
@@ -3899,8 +3697,8 @@
             </p:nvSpPr>
             <p:spPr>
               <a:xfrm>
-                <a:off x="9013587" y="1129884"/>
-                <a:ext cx="1828800" cy="753928"/>
+                <a:off x="9013587" y="1129883"/>
+                <a:ext cx="1828800" cy="768929"/>
               </a:xfrm>
               <a:prstGeom prst="rect">
                 <a:avLst/>
@@ -3953,8 +3751,8 @@
             </p:nvSpPr>
             <p:spPr>
               <a:xfrm>
-                <a:off x="9573564" y="999078"/>
-                <a:ext cx="708848" cy="261610"/>
+                <a:off x="9484958" y="1014098"/>
+                <a:ext cx="886060" cy="231569"/>
               </a:xfrm>
               <a:prstGeom prst="rect">
                 <a:avLst/>
@@ -3996,8 +3794,8 @@
           </p:nvGrpSpPr>
           <p:grpSpPr>
             <a:xfrm>
-              <a:off x="3297357" y="2261175"/>
-              <a:ext cx="2743200" cy="2156307"/>
+              <a:off x="5378391" y="2261175"/>
+              <a:ext cx="2286000" cy="2156307"/>
               <a:chOff x="1396180" y="1760660"/>
               <a:chExt cx="3382967" cy="2659197"/>
             </a:xfrm>
@@ -4064,8 +3862,8 @@
             </p:nvSpPr>
             <p:spPr>
               <a:xfrm>
-                <a:off x="2436092" y="1760660"/>
-                <a:ext cx="1303143" cy="322623"/>
+                <a:off x="2277311" y="1760660"/>
+                <a:ext cx="1620705" cy="322622"/>
               </a:xfrm>
               <a:prstGeom prst="rect">
                 <a:avLst/>
@@ -4107,7 +3905,7 @@
           </p:nvGrpSpPr>
           <p:grpSpPr>
             <a:xfrm>
-              <a:off x="5299147" y="973201"/>
+              <a:off x="5716160" y="973201"/>
               <a:ext cx="1614480" cy="1304902"/>
               <a:chOff x="5299147" y="794353"/>
               <a:chExt cx="1614480" cy="1304902"/>
@@ -4266,10 +4064,10 @@
           </p:nvGrpSpPr>
           <p:grpSpPr>
             <a:xfrm>
-              <a:off x="6159500" y="2261175"/>
-              <a:ext cx="2743200" cy="2156307"/>
-              <a:chOff x="1396180" y="1760660"/>
-              <a:chExt cx="3382967" cy="2659197"/>
+              <a:off x="7801448" y="991088"/>
+              <a:ext cx="1463040" cy="4086303"/>
+              <a:chOff x="1396180" y="1822828"/>
+              <a:chExt cx="3382967" cy="2597029"/>
             </a:xfrm>
           </p:grpSpPr>
           <p:sp>
@@ -4334,8 +4132,8 @@
             </p:nvSpPr>
             <p:spPr>
               <a:xfrm>
-                <a:off x="2794892" y="1760660"/>
-                <a:ext cx="585545" cy="322622"/>
+                <a:off x="2538713" y="1822828"/>
+                <a:ext cx="1097894" cy="198287"/>
               </a:xfrm>
               <a:prstGeom prst="rect">
                 <a:avLst/>
@@ -4377,8 +4175,8 @@
           </p:nvGrpSpPr>
           <p:grpSpPr>
             <a:xfrm>
-              <a:off x="7558603" y="5333853"/>
-              <a:ext cx="3291840" cy="502920"/>
+              <a:off x="7823200" y="5372116"/>
+              <a:ext cx="3041382" cy="464656"/>
               <a:chOff x="7672377" y="5409118"/>
               <a:chExt cx="3291840" cy="502920"/>
             </a:xfrm>

</xml_diff>